<commit_message>
edits made  Please enter the commit message for your changes. Lines starting
</commit_message>
<xml_diff>
--- a/Draft_Poster.pptx
+++ b/Draft_Poster.pptx
@@ -6,7 +6,6 @@
   </p:sldMasterIdLst>
   <p:sldIdLst>
     <p:sldId id="256" r:id="rId2"/>
-    <p:sldId id="257" r:id="rId3"/>
   </p:sldIdLst>
   <p:sldSz cx="12192000" cy="6858000"/>
   <p:notesSz cx="6858000" cy="9144000"/>
@@ -260,7 +259,7 @@
           <a:p>
             <a:fld id="{17B15591-64E1-4620-A2EF-1876399A9EDC}" type="datetimeFigureOut">
               <a:rPr lang="en-US" smtClean="0"/>
-              <a:t>3/14/2019</a:t>
+              <a:t>3/19/2019</a:t>
             </a:fld>
             <a:endParaRPr lang="en-US"/>
           </a:p>
@@ -458,7 +457,7 @@
           <a:p>
             <a:fld id="{17B15591-64E1-4620-A2EF-1876399A9EDC}" type="datetimeFigureOut">
               <a:rPr lang="en-US" smtClean="0"/>
-              <a:t>3/14/2019</a:t>
+              <a:t>3/19/2019</a:t>
             </a:fld>
             <a:endParaRPr lang="en-US"/>
           </a:p>
@@ -666,7 +665,7 @@
           <a:p>
             <a:fld id="{17B15591-64E1-4620-A2EF-1876399A9EDC}" type="datetimeFigureOut">
               <a:rPr lang="en-US" smtClean="0"/>
-              <a:t>3/14/2019</a:t>
+              <a:t>3/19/2019</a:t>
             </a:fld>
             <a:endParaRPr lang="en-US"/>
           </a:p>
@@ -864,7 +863,7 @@
           <a:p>
             <a:fld id="{17B15591-64E1-4620-A2EF-1876399A9EDC}" type="datetimeFigureOut">
               <a:rPr lang="en-US" smtClean="0"/>
-              <a:t>3/14/2019</a:t>
+              <a:t>3/19/2019</a:t>
             </a:fld>
             <a:endParaRPr lang="en-US"/>
           </a:p>
@@ -1139,7 +1138,7 @@
           <a:p>
             <a:fld id="{17B15591-64E1-4620-A2EF-1876399A9EDC}" type="datetimeFigureOut">
               <a:rPr lang="en-US" smtClean="0"/>
-              <a:t>3/14/2019</a:t>
+              <a:t>3/19/2019</a:t>
             </a:fld>
             <a:endParaRPr lang="en-US"/>
           </a:p>
@@ -1404,7 +1403,7 @@
           <a:p>
             <a:fld id="{17B15591-64E1-4620-A2EF-1876399A9EDC}" type="datetimeFigureOut">
               <a:rPr lang="en-US" smtClean="0"/>
-              <a:t>3/14/2019</a:t>
+              <a:t>3/19/2019</a:t>
             </a:fld>
             <a:endParaRPr lang="en-US"/>
           </a:p>
@@ -1816,7 +1815,7 @@
           <a:p>
             <a:fld id="{17B15591-64E1-4620-A2EF-1876399A9EDC}" type="datetimeFigureOut">
               <a:rPr lang="en-US" smtClean="0"/>
-              <a:t>3/14/2019</a:t>
+              <a:t>3/19/2019</a:t>
             </a:fld>
             <a:endParaRPr lang="en-US"/>
           </a:p>
@@ -1957,7 +1956,7 @@
           <a:p>
             <a:fld id="{17B15591-64E1-4620-A2EF-1876399A9EDC}" type="datetimeFigureOut">
               <a:rPr lang="en-US" smtClean="0"/>
-              <a:t>3/14/2019</a:t>
+              <a:t>3/19/2019</a:t>
             </a:fld>
             <a:endParaRPr lang="en-US"/>
           </a:p>
@@ -2070,7 +2069,7 @@
           <a:p>
             <a:fld id="{17B15591-64E1-4620-A2EF-1876399A9EDC}" type="datetimeFigureOut">
               <a:rPr lang="en-US" smtClean="0"/>
-              <a:t>3/14/2019</a:t>
+              <a:t>3/19/2019</a:t>
             </a:fld>
             <a:endParaRPr lang="en-US"/>
           </a:p>
@@ -2381,7 +2380,7 @@
           <a:p>
             <a:fld id="{17B15591-64E1-4620-A2EF-1876399A9EDC}" type="datetimeFigureOut">
               <a:rPr lang="en-US" smtClean="0"/>
-              <a:t>3/14/2019</a:t>
+              <a:t>3/19/2019</a:t>
             </a:fld>
             <a:endParaRPr lang="en-US"/>
           </a:p>
@@ -2669,7 +2668,7 @@
           <a:p>
             <a:fld id="{17B15591-64E1-4620-A2EF-1876399A9EDC}" type="datetimeFigureOut">
               <a:rPr lang="en-US" smtClean="0"/>
-              <a:t>3/14/2019</a:t>
+              <a:t>3/19/2019</a:t>
             </a:fld>
             <a:endParaRPr lang="en-US"/>
           </a:p>
@@ -2910,7 +2909,7 @@
           <a:p>
             <a:fld id="{17B15591-64E1-4620-A2EF-1876399A9EDC}" type="datetimeFigureOut">
               <a:rPr lang="en-US" smtClean="0"/>
-              <a:t>3/14/2019</a:t>
+              <a:t>3/19/2019</a:t>
             </a:fld>
             <a:endParaRPr lang="en-US"/>
           </a:p>
@@ -3346,8 +3345,8 @@
         </p:nvSpPr>
         <p:spPr>
           <a:xfrm>
-            <a:off x="292961" y="206876"/>
-            <a:ext cx="11514339" cy="1200329"/>
+            <a:off x="305759" y="132753"/>
+            <a:ext cx="11639434" cy="1200329"/>
           </a:xfrm>
           <a:prstGeom prst="rect">
             <a:avLst/>
@@ -3370,14 +3369,7 @@
             <a:pPr algn="ctr"/>
             <a:r>
               <a:rPr lang="en-US" b="1" dirty="0"/>
-              <a:t>Implementing the Dirichlet Process to Improve </a:t>
-            </a:r>
-          </a:p>
-          <a:p>
-            <a:pPr algn="ctr"/>
-            <a:r>
-              <a:rPr lang="en-US" b="1" dirty="0"/>
-              <a:t>Computational Efficiency of Partition of Big Data Sets </a:t>
+              <a:t>Implementing the Fossilized Birth-Death Model</a:t>
             </a:r>
           </a:p>
           <a:p>
@@ -3391,7 +3383,14 @@
             <a:pPr algn="ctr"/>
             <a:r>
               <a:rPr lang="en-US" dirty="0"/>
-              <a:t>Department of Biological Science, Southeastern Louisiana University</a:t>
+              <a:t>Department of Biological Science, </a:t>
+            </a:r>
+          </a:p>
+          <a:p>
+            <a:pPr algn="ctr"/>
+            <a:r>
+              <a:rPr lang="en-US" dirty="0"/>
+              <a:t>Southeastern Louisiana University</a:t>
             </a:r>
           </a:p>
         </p:txBody>
@@ -3410,8 +3409,8 @@
         </p:nvSpPr>
         <p:spPr>
           <a:xfrm>
-            <a:off x="292961" y="3973468"/>
-            <a:ext cx="3217639" cy="2677656"/>
+            <a:off x="305759" y="3942690"/>
+            <a:ext cx="3217639" cy="2708434"/>
           </a:xfrm>
           <a:prstGeom prst="rect">
             <a:avLst/>
@@ -3434,16 +3433,15 @@
           <a:lstStyle/>
           <a:p>
             <a:r>
-              <a:rPr lang="en-US" sz="1050" b="1" dirty="0"/>
-              <a:t>Why Ants ?</a:t>
-            </a:r>
-          </a:p>
-          <a:p>
-            <a:r>
-              <a:rPr lang="en-US" sz="1050" dirty="0"/>
-              <a:t>Ants are an extraordinary model species to test our theory in the Dirichlet Process and its ability to improve computational efficiency in partitioning large data sets. Scattered countlessly across the surface of the earth are nearly 15,000 described ant species. These ants are major parts of every ecosystem they inhabit as they aid tremendously in the decomposition of most motile macro organisms. Ants scientifically named as Formicidae, diverged into their own lineage approximately 139 million years ago and have been monumental factors across the globe since. Their combined biomass is nearly equal to that of humanity’s. Their current diversity in conjunction to their enormous fossil records provides astounding amounts of genetic data for phylogenetic testing and analysis. </a:t>
-            </a:r>
-            <a:endParaRPr lang="en-US" sz="4000" dirty="0"/>
+              <a:rPr lang="en-US" sz="1400" b="1" dirty="0"/>
+              <a:t>Why Use Ants? </a:t>
+            </a:r>
+          </a:p>
+          <a:p>
+            <a:r>
+              <a:rPr lang="en-US" sz="1300" dirty="0"/>
+              <a:t>Scattered countlessly across the surface of the earth are nearly 15,000 described ant species. These ants are major parts of every ecosystem they inhabit as they aid tremendously in the decomposition as well interacting directly with most of the flora. Scientifically known as Formicidae, ants’ biomass approximately equals that of humanity. Their current diversity in conjunction to their enormous fossil records provides astounding amounts of genetic data for phylogenetic testing and analysis. </a:t>
+            </a:r>
           </a:p>
         </p:txBody>
       </p:sp>
@@ -3461,8 +3459,8 @@
         </p:nvSpPr>
         <p:spPr>
           <a:xfrm>
-            <a:off x="8279207" y="1457394"/>
-            <a:ext cx="3497801" cy="1869743"/>
+            <a:off x="8549196" y="4942964"/>
+            <a:ext cx="3395997" cy="1708160"/>
           </a:xfrm>
           <a:prstGeom prst="rect">
             <a:avLst/>
@@ -3485,40 +3483,15 @@
           <a:lstStyle/>
           <a:p>
             <a:r>
-              <a:rPr lang="en-US" sz="1050" b="1" dirty="0"/>
-              <a:t>Implementing the </a:t>
-            </a:r>
-            <a:r>
-              <a:rPr lang="en-US" sz="1050" b="1" dirty="0" err="1"/>
-              <a:t>Dirchlet</a:t>
-            </a:r>
-            <a:r>
-              <a:rPr lang="en-US" sz="1050" b="1" dirty="0"/>
-              <a:t> Process</a:t>
-            </a:r>
-          </a:p>
-          <a:p>
-            <a:r>
-              <a:rPr lang="en-US" sz="1050" dirty="0"/>
-              <a:t>Genetic data increasingly grows as fossils are collected overtime. The large genetics data sets become progressively difficult for functions to process. This often makes running the functions with these large data sets time consuming. The </a:t>
-            </a:r>
-            <a:r>
-              <a:rPr lang="en-US" sz="1050" dirty="0" err="1"/>
-              <a:t>Dirchlet</a:t>
-            </a:r>
-            <a:r>
-              <a:rPr lang="en-US" sz="1050" dirty="0"/>
-              <a:t> Process is a mixture model the automates finding the subsets of genes that need to be modeled separately. Implementing the </a:t>
-            </a:r>
-            <a:r>
-              <a:rPr lang="en-US" sz="1050" dirty="0" err="1"/>
-              <a:t>Dirchlet</a:t>
-            </a:r>
-            <a:r>
-              <a:rPr lang="en-US" sz="1050" dirty="0"/>
-              <a:t> Process on top of another function, the FDB model, will increase efficient statistical modeling of the biological inferencing through partitioning large data sets.</a:t>
-            </a:r>
-            <a:endParaRPr lang="en-US" sz="1400" dirty="0"/>
+              <a:rPr lang="en-US" sz="1400" b="1" dirty="0"/>
+              <a:t>Expected Results</a:t>
+            </a:r>
+          </a:p>
+          <a:p>
+            <a:r>
+              <a:rPr lang="en-US" sz="1300" dirty="0"/>
+              <a:t>From the phylogeny produced, insight on the evolutionary forces that affect ants and their diversification can expected to be seen. Verification of the Fossilized Birth-Death Model  as an appropriate function to model evolutionary processes can be compared to known phylogenies. </a:t>
+            </a:r>
           </a:p>
         </p:txBody>
       </p:sp>
@@ -3536,8 +3509,8 @@
         </p:nvSpPr>
         <p:spPr>
           <a:xfrm>
-            <a:off x="3893055" y="5132911"/>
-            <a:ext cx="4033988" cy="461665"/>
+            <a:off x="4019303" y="5604684"/>
+            <a:ext cx="4033988" cy="1046440"/>
           </a:xfrm>
           <a:prstGeom prst="rect">
             <a:avLst/>
@@ -3559,9 +3532,19 @@
           </a:bodyPr>
           <a:lstStyle/>
           <a:p>
-            <a:r>
-              <a:rPr lang="en-US" sz="2400" dirty="0"/>
-              <a:t>Acknowledgement </a:t>
+            <a:endParaRPr lang="en-US" sz="1400" b="1" dirty="0"/>
+          </a:p>
+          <a:p>
+            <a:endParaRPr lang="en-US" sz="1600" b="1" dirty="0"/>
+          </a:p>
+          <a:p>
+            <a:endParaRPr lang="en-US" sz="1400" b="1" dirty="0"/>
+          </a:p>
+          <a:p>
+            <a:pPr algn="ctr"/>
+            <a:r>
+              <a:rPr lang="en-US" b="1" dirty="0"/>
+              <a:t>Acknowledgements</a:t>
             </a:r>
           </a:p>
         </p:txBody>
@@ -3595,8 +3578,8 @@
         </p:blipFill>
         <p:spPr bwMode="auto">
           <a:xfrm>
-            <a:off x="3918711" y="1608064"/>
-            <a:ext cx="3095447" cy="3323987"/>
+            <a:off x="4019303" y="1553074"/>
+            <a:ext cx="4033988" cy="3751851"/>
           </a:xfrm>
           <a:prstGeom prst="rect">
             <a:avLst/>
@@ -3628,7 +3611,7 @@
         <p:spPr>
           <a:xfrm>
             <a:off x="305759" y="1476555"/>
-            <a:ext cx="3204841" cy="2400657"/>
+            <a:ext cx="3217639" cy="2308324"/>
           </a:xfrm>
           <a:prstGeom prst="rect">
             <a:avLst/>
@@ -3651,22 +3634,22 @@
           <a:lstStyle/>
           <a:p>
             <a:r>
-              <a:rPr lang="en-US" sz="1000" b="1" dirty="0"/>
+              <a:rPr lang="en-US" sz="1400" b="1" dirty="0"/>
               <a:t>What is a Phylogeny ?</a:t>
             </a:r>
           </a:p>
           <a:p>
             <a:r>
-              <a:rPr lang="en-US" sz="1000" dirty="0"/>
-              <a:t>Phylogenetic is the study of evolutionary relationships among biological entities including species, individuals, and genes. To model these evolutionary relationships statistical functions can derived that mirror the natural processes. These functions can then be applied to different data sets based on what is trying to be analyzed or solved. Many functions are available and take many different variables into account. Choosing which functions best fits your genetic data as well as what best models the natural evolutionary relationships often is based off the data being evaluated. Running these complex statistical functions requires high processing computer-based software such as </a:t>
-            </a:r>
-            <a:r>
-              <a:rPr lang="en-US" sz="1000" dirty="0" err="1"/>
+              <a:rPr lang="en-US" sz="1300" dirty="0"/>
+              <a:t>Phylogenetic is the study of evolutionary relationships among biological entities including species, individuals, and genes. To model these evolutionary relationships statistical functions can derived that mirror the natural processes. Running these complex statistical functions requires high processing computer-based software such as </a:t>
+            </a:r>
+            <a:r>
+              <a:rPr lang="en-US" sz="1300" dirty="0" err="1"/>
               <a:t>RevBayes</a:t>
             </a:r>
             <a:r>
-              <a:rPr lang="en-US" sz="1000" dirty="0"/>
-              <a:t>. Results of our function are configured into the phylogeny.</a:t>
+              <a:rPr lang="en-US" sz="1300" dirty="0"/>
+              <a:t>. Results of our function are configured into the phylogeny. </a:t>
             </a:r>
           </a:p>
         </p:txBody>
@@ -3685,8 +3668,8 @@
         </p:nvSpPr>
         <p:spPr>
           <a:xfrm>
-            <a:off x="8270326" y="3429000"/>
-            <a:ext cx="3497801" cy="3323987"/>
+            <a:off x="8549196" y="1476555"/>
+            <a:ext cx="3395997" cy="3308598"/>
           </a:xfrm>
           <a:prstGeom prst="rect">
             <a:avLst/>
@@ -3709,31 +3692,36 @@
           <a:lstStyle/>
           <a:p>
             <a:r>
-              <a:rPr lang="en-US" sz="1050" b="1" dirty="0"/>
+              <a:rPr lang="en-US" sz="1400" b="1" dirty="0"/>
               <a:t>Methods</a:t>
             </a:r>
           </a:p>
           <a:p>
             <a:r>
-              <a:rPr lang="en-US" sz="1050" dirty="0"/>
-              <a:t>This </a:t>
-            </a:r>
-            <a:r>
-              <a:rPr lang="en-US" sz="1050" dirty="0" err="1"/>
+              <a:rPr lang="en-US" sz="1300" dirty="0"/>
+              <a:t>In our experiment, we’d like to better understand the phylogenetic tree of Formicidae as provides much insight on the evolutionary processes that affect not just ants, but any closely interacting species. This </a:t>
+            </a:r>
+            <a:r>
+              <a:rPr lang="en-US" sz="1300" dirty="0" err="1"/>
               <a:t>Baysian</a:t>
             </a:r>
             <a:r>
-              <a:rPr lang="en-US" sz="1050" dirty="0"/>
+              <a:rPr lang="en-US" sz="1300" dirty="0"/>
               <a:t> “total evidence” phylogenetic analysis of extant and fossils species, combining morphological and molecular data as well as stratigraphic ranges from the fossil samples is called the Fossilized Birth-Death Model. Morphological data is the phenotypic or physical data and the molecular data is the genetic data. Stratigraphic ranges are the approximated range of the fossil specimen’s age. The FBD function is ran using </a:t>
             </a:r>
             <a:r>
-              <a:rPr lang="en-US" sz="1050" dirty="0" err="1"/>
+              <a:rPr lang="en-US" sz="1300" dirty="0" err="1"/>
               <a:t>RevBayes</a:t>
             </a:r>
             <a:r>
-              <a:rPr lang="en-US" sz="1050" dirty="0"/>
-              <a:t>. In our experiment, we’d like to better understand the phylogenetic tree of Formicidae. Our base function to run our analysis of genetic data collected and compose a phylogenetic tree, is the FDB model. This requires that our genetic data on Formicidae be formatted to selective inputs of the FBD model function. With a group selected Formicidae genus that we’ve obtained genetic info for, we sorted through the extant species and extinct species. Next approximations of intervals of the extinct fossils must be derived. Lastly, genetic data as well as fossil intervals are inputted into the FBD model function to create a phylogeny. </a:t>
-            </a:r>
+              <a:rPr lang="en-US" sz="1300" dirty="0"/>
+              <a:t>. </a:t>
+            </a:r>
+            <a:endParaRPr lang="en-US" sz="1300" dirty="0">
+              <a:solidFill>
+                <a:srgbClr val="FF0000"/>
+              </a:solidFill>
+            </a:endParaRPr>
           </a:p>
         </p:txBody>
       </p:sp>
@@ -3758,8 +3746,8 @@
         </p:blipFill>
         <p:spPr>
           <a:xfrm>
-            <a:off x="9192305" y="464698"/>
-            <a:ext cx="2020191" cy="407683"/>
+            <a:off x="9126468" y="388937"/>
+            <a:ext cx="2241452" cy="559205"/>
           </a:xfrm>
           <a:prstGeom prst="rect">
             <a:avLst/>
@@ -3800,7 +3788,7 @@
         </p:blipFill>
         <p:spPr bwMode="auto">
           <a:xfrm>
-            <a:off x="460574" y="313177"/>
+            <a:off x="473372" y="313175"/>
             <a:ext cx="2882412" cy="710727"/>
           </a:xfrm>
           <a:prstGeom prst="rect">
@@ -3850,7 +3838,7 @@
         </p:blipFill>
         <p:spPr bwMode="auto">
           <a:xfrm>
-            <a:off x="5910049" y="5754846"/>
+            <a:off x="5953958" y="5684987"/>
             <a:ext cx="1836432" cy="566527"/>
           </a:xfrm>
           <a:prstGeom prst="rect">
@@ -3897,8 +3885,8 @@
         </p:blipFill>
         <p:spPr bwMode="auto">
           <a:xfrm>
-            <a:off x="4364476" y="5754846"/>
-            <a:ext cx="1354345" cy="621935"/>
+            <a:off x="4369787" y="5669687"/>
+            <a:ext cx="1233687" cy="566527"/>
           </a:xfrm>
           <a:prstGeom prst="rect">
             <a:avLst/>
@@ -3924,652 +3912,6 @@
   </p:cSld>
   <p:clrMapOvr>
     <a:overrideClrMapping bg1="lt1" tx1="dk1" bg2="lt2" tx2="dk2" accent1="accent1" accent2="accent2" accent3="accent3" accent4="accent4" accent5="accent5" accent6="accent6" hlink="hlink" folHlink="folHlink"/>
-  </p:clrMapOvr>
-</p:sld>
-</file>
-
-<file path=ppt/slides/slide2.xml><?xml version="1.0" encoding="utf-8"?>
-<p:sld xmlns:a="http://schemas.openxmlformats.org/drawingml/2006/main" xmlns:r="http://schemas.openxmlformats.org/officeDocument/2006/relationships" xmlns:p="http://schemas.openxmlformats.org/presentationml/2006/main">
-  <p:cSld>
-    <p:spTree>
-      <p:nvGrpSpPr>
-        <p:cNvPr id="1" name=""/>
-        <p:cNvGrpSpPr/>
-        <p:nvPr/>
-      </p:nvGrpSpPr>
-      <p:grpSpPr>
-        <a:xfrm>
-          <a:off x="0" y="0"/>
-          <a:ext cx="0" cy="0"/>
-          <a:chOff x="0" y="0"/>
-          <a:chExt cx="0" cy="0"/>
-        </a:xfrm>
-      </p:grpSpPr>
-      <p:sp>
-        <p:nvSpPr>
-          <p:cNvPr id="5" name="TextBox 4">
-            <a:extLst>
-              <a:ext uri="{FF2B5EF4-FFF2-40B4-BE49-F238E27FC236}">
-                <a16:creationId xmlns:a16="http://schemas.microsoft.com/office/drawing/2014/main" id="{CA02D8EA-796D-4579-8DE3-CCDFA1454BC2}"/>
-              </a:ext>
-            </a:extLst>
-          </p:cNvPr>
-          <p:cNvSpPr txBox="1"/>
-          <p:nvPr/>
-        </p:nvSpPr>
-        <p:spPr>
-          <a:xfrm>
-            <a:off x="292961" y="3798510"/>
-            <a:ext cx="3217639" cy="2677656"/>
-          </a:xfrm>
-          <a:prstGeom prst="rect">
-            <a:avLst/>
-          </a:prstGeom>
-          <a:solidFill>
-            <a:schemeClr val="bg1">
-              <a:lumMod val="95000"/>
-            </a:schemeClr>
-          </a:solidFill>
-          <a:ln>
-            <a:solidFill>
-              <a:schemeClr val="accent1"/>
-            </a:solidFill>
-          </a:ln>
-        </p:spPr>
-        <p:txBody>
-          <a:bodyPr wrap="square" rtlCol="0">
-            <a:spAutoFit/>
-          </a:bodyPr>
-          <a:lstStyle/>
-          <a:p>
-            <a:r>
-              <a:rPr lang="en-US" sz="1050" b="1" dirty="0"/>
-              <a:t>Why Ants ?</a:t>
-            </a:r>
-          </a:p>
-          <a:p>
-            <a:r>
-              <a:rPr lang="en-US" sz="1050" dirty="0"/>
-              <a:t>Ants are an extraordinary model species to test our theory in the Dirichlet Process and its ability to improve computational efficiency in partitioning large data sets. Scattered countlessly across the surface of the earth are nearly 15,000 described ant species. These ants are major parts of every ecosystem they inhabit as they aid tremendously in the decomposition of most motile macro organisms. Ants scientifically named as Formicidae, diverged into their own lineage approximately 139 million years ago and have been monumental factors across the globe since. Their combined biomass is nearly equal to that of humanity’s. Their current diversity in conjunction to their enormous fossil records provides astounding amounts of genetic data for phylogenetic testing and analysis. </a:t>
-            </a:r>
-            <a:endParaRPr lang="en-US" sz="4000" dirty="0"/>
-          </a:p>
-        </p:txBody>
-      </p:sp>
-      <p:sp>
-        <p:nvSpPr>
-          <p:cNvPr id="7" name="TextBox 6">
-            <a:extLst>
-              <a:ext uri="{FF2B5EF4-FFF2-40B4-BE49-F238E27FC236}">
-                <a16:creationId xmlns:a16="http://schemas.microsoft.com/office/drawing/2014/main" id="{0DA6C93D-81A2-4292-8193-65DD322A3393}"/>
-              </a:ext>
-            </a:extLst>
-          </p:cNvPr>
-          <p:cNvSpPr txBox="1"/>
-          <p:nvPr/>
-        </p:nvSpPr>
-        <p:spPr>
-          <a:xfrm>
-            <a:off x="8309500" y="206876"/>
-            <a:ext cx="3576742" cy="1708160"/>
-          </a:xfrm>
-          <a:prstGeom prst="rect">
-            <a:avLst/>
-          </a:prstGeom>
-          <a:solidFill>
-            <a:schemeClr val="bg1">
-              <a:lumMod val="95000"/>
-            </a:schemeClr>
-          </a:solidFill>
-          <a:ln>
-            <a:solidFill>
-              <a:schemeClr val="accent1"/>
-            </a:solidFill>
-          </a:ln>
-        </p:spPr>
-        <p:txBody>
-          <a:bodyPr wrap="square" rtlCol="0">
-            <a:spAutoFit/>
-          </a:bodyPr>
-          <a:lstStyle/>
-          <a:p>
-            <a:r>
-              <a:rPr lang="en-US" sz="1050" b="1" dirty="0"/>
-              <a:t>Implementing the </a:t>
-            </a:r>
-            <a:r>
-              <a:rPr lang="en-US" sz="1050" b="1" dirty="0" err="1"/>
-              <a:t>Dirchlet</a:t>
-            </a:r>
-            <a:r>
-              <a:rPr lang="en-US" sz="1050" b="1" dirty="0"/>
-              <a:t> Process</a:t>
-            </a:r>
-          </a:p>
-          <a:p>
-            <a:r>
-              <a:rPr lang="en-US" sz="1050" dirty="0"/>
-              <a:t>Genetic data increasingly grows as fossils are collected overtime. The large genetics data sets become progressively difficult for functions to process. This often makes running the functions with these large data sets time consuming. The </a:t>
-            </a:r>
-            <a:r>
-              <a:rPr lang="en-US" sz="1050" dirty="0" err="1"/>
-              <a:t>Dirchlet</a:t>
-            </a:r>
-            <a:r>
-              <a:rPr lang="en-US" sz="1050" dirty="0"/>
-              <a:t> Process is a mixture model the automates finding the subsets of genes that need to be modeled separately. Implementing the </a:t>
-            </a:r>
-            <a:r>
-              <a:rPr lang="en-US" sz="1050" dirty="0" err="1"/>
-              <a:t>Dirchlet</a:t>
-            </a:r>
-            <a:r>
-              <a:rPr lang="en-US" sz="1050" dirty="0"/>
-              <a:t> Process on top of another function, the FDB model, will increase efficient statistical modeling of the biological inferencing through partitioning large data sets.</a:t>
-            </a:r>
-            <a:endParaRPr lang="en-US" sz="1400" dirty="0"/>
-          </a:p>
-        </p:txBody>
-      </p:sp>
-      <p:sp>
-        <p:nvSpPr>
-          <p:cNvPr id="8" name="TextBox 7">
-            <a:extLst>
-              <a:ext uri="{FF2B5EF4-FFF2-40B4-BE49-F238E27FC236}">
-                <a16:creationId xmlns:a16="http://schemas.microsoft.com/office/drawing/2014/main" id="{FF9E272A-6AD5-45AB-9B43-A19E255D1F51}"/>
-              </a:ext>
-            </a:extLst>
-          </p:cNvPr>
-          <p:cNvSpPr txBox="1"/>
-          <p:nvPr/>
-        </p:nvSpPr>
-        <p:spPr>
-          <a:xfrm>
-            <a:off x="8309500" y="2964389"/>
-            <a:ext cx="3576741" cy="1938992"/>
-          </a:xfrm>
-          <a:prstGeom prst="rect">
-            <a:avLst/>
-          </a:prstGeom>
-          <a:solidFill>
-            <a:schemeClr val="bg1">
-              <a:lumMod val="95000"/>
-            </a:schemeClr>
-          </a:solidFill>
-          <a:ln>
-            <a:solidFill>
-              <a:schemeClr val="accent1"/>
-            </a:solidFill>
-          </a:ln>
-        </p:spPr>
-        <p:txBody>
-          <a:bodyPr wrap="square" rtlCol="0">
-            <a:spAutoFit/>
-          </a:bodyPr>
-          <a:lstStyle/>
-          <a:p>
-            <a:r>
-              <a:rPr lang="en-US" sz="4000" dirty="0"/>
-              <a:t>5. Expected results Discussion</a:t>
-            </a:r>
-          </a:p>
-        </p:txBody>
-      </p:sp>
-      <p:sp>
-        <p:nvSpPr>
-          <p:cNvPr id="10" name="TextBox 9">
-            <a:extLst>
-              <a:ext uri="{FF2B5EF4-FFF2-40B4-BE49-F238E27FC236}">
-                <a16:creationId xmlns:a16="http://schemas.microsoft.com/office/drawing/2014/main" id="{58C307F4-600E-4AEE-B2AC-8F180C6C4C67}"/>
-              </a:ext>
-            </a:extLst>
-          </p:cNvPr>
-          <p:cNvSpPr txBox="1"/>
-          <p:nvPr/>
-        </p:nvSpPr>
-        <p:spPr>
-          <a:xfrm>
-            <a:off x="8309499" y="5150911"/>
-            <a:ext cx="3576741" cy="461665"/>
-          </a:xfrm>
-          <a:prstGeom prst="rect">
-            <a:avLst/>
-          </a:prstGeom>
-          <a:solidFill>
-            <a:schemeClr val="bg1">
-              <a:lumMod val="95000"/>
-            </a:schemeClr>
-          </a:solidFill>
-          <a:ln>
-            <a:solidFill>
-              <a:schemeClr val="accent1"/>
-            </a:solidFill>
-          </a:ln>
-        </p:spPr>
-        <p:txBody>
-          <a:bodyPr wrap="square" rtlCol="0">
-            <a:spAutoFit/>
-          </a:bodyPr>
-          <a:lstStyle/>
-          <a:p>
-            <a:r>
-              <a:rPr lang="en-US" sz="2400" dirty="0"/>
-              <a:t>Acknowledgement </a:t>
-            </a:r>
-          </a:p>
-        </p:txBody>
-      </p:sp>
-      <p:pic>
-        <p:nvPicPr>
-          <p:cNvPr id="1028" name="Picture 4" descr="Image result for phylogenetic ant tree">
-            <a:extLst>
-              <a:ext uri="{FF2B5EF4-FFF2-40B4-BE49-F238E27FC236}">
-                <a16:creationId xmlns:a16="http://schemas.microsoft.com/office/drawing/2014/main" id="{6DCD5189-60E5-4CE0-81DA-1A9527D972F3}"/>
-              </a:ext>
-            </a:extLst>
-          </p:cNvPr>
-          <p:cNvPicPr>
-            <a:picLocks noChangeAspect="1" noChangeArrowheads="1"/>
-          </p:cNvPicPr>
-          <p:nvPr/>
-        </p:nvPicPr>
-        <p:blipFill>
-          <a:blip r:embed="rId2">
-            <a:extLst>
-              <a:ext uri="{28A0092B-C50C-407E-A947-70E740481C1C}">
-                <a14:useLocalDpi xmlns:a14="http://schemas.microsoft.com/office/drawing/2010/main" val="0"/>
-              </a:ext>
-            </a:extLst>
-          </a:blip>
-          <a:srcRect/>
-          <a:stretch>
-            <a:fillRect/>
-          </a:stretch>
-        </p:blipFill>
-        <p:spPr bwMode="auto">
-          <a:xfrm>
-            <a:off x="3825517" y="1262471"/>
-            <a:ext cx="2219984" cy="2400656"/>
-          </a:xfrm>
-          <a:prstGeom prst="rect">
-            <a:avLst/>
-          </a:prstGeom>
-          <a:noFill/>
-          <a:extLst>
-            <a:ext uri="{909E8E84-426E-40DD-AFC4-6F175D3DCCD1}">
-              <a14:hiddenFill xmlns:a14="http://schemas.microsoft.com/office/drawing/2010/main">
-                <a:solidFill>
-                  <a:srgbClr val="FFFFFF"/>
-                </a:solidFill>
-              </a14:hiddenFill>
-            </a:ext>
-          </a:extLst>
-        </p:spPr>
-      </p:pic>
-      <p:sp>
-        <p:nvSpPr>
-          <p:cNvPr id="12" name="TextBox 11">
-            <a:extLst>
-              <a:ext uri="{FF2B5EF4-FFF2-40B4-BE49-F238E27FC236}">
-                <a16:creationId xmlns:a16="http://schemas.microsoft.com/office/drawing/2014/main" id="{261B2909-CD91-4782-AC8D-01A2AA446272}"/>
-              </a:ext>
-            </a:extLst>
-          </p:cNvPr>
-          <p:cNvSpPr txBox="1"/>
-          <p:nvPr/>
-        </p:nvSpPr>
-        <p:spPr>
-          <a:xfrm>
-            <a:off x="305759" y="1263425"/>
-            <a:ext cx="3204841" cy="2400657"/>
-          </a:xfrm>
-          <a:prstGeom prst="rect">
-            <a:avLst/>
-          </a:prstGeom>
-          <a:solidFill>
-            <a:schemeClr val="bg1">
-              <a:lumMod val="95000"/>
-            </a:schemeClr>
-          </a:solidFill>
-          <a:ln>
-            <a:solidFill>
-              <a:schemeClr val="accent1"/>
-            </a:solidFill>
-          </a:ln>
-        </p:spPr>
-        <p:txBody>
-          <a:bodyPr wrap="square" rtlCol="0">
-            <a:spAutoFit/>
-          </a:bodyPr>
-          <a:lstStyle/>
-          <a:p>
-            <a:r>
-              <a:rPr lang="en-US" sz="1000" b="1" dirty="0"/>
-              <a:t>What is a Phylogeny ?</a:t>
-            </a:r>
-          </a:p>
-          <a:p>
-            <a:r>
-              <a:rPr lang="en-US" sz="1000" dirty="0"/>
-              <a:t>Phylogenetic is the study of evolutionary relationships among biological entities including species, individuals, and genes. To model these evolutionary relationships statistical functions can derived that mirror the natural processes. These functions can then be applied to different data sets based on what is trying to be analyzed or solved. Many functions are available and take many different variables into account. Choosing which functions best fits your genetic data as well as what best models the natural evolutionary relationships often is based off the data being evaluated. Running these complex statistical functions requires high processing computer-based software such as </a:t>
-            </a:r>
-            <a:r>
-              <a:rPr lang="en-US" sz="1000" dirty="0" err="1"/>
-              <a:t>RevBayes</a:t>
-            </a:r>
-            <a:r>
-              <a:rPr lang="en-US" sz="1000" dirty="0"/>
-              <a:t>. Results of our function are configured into the phylogeny.</a:t>
-            </a:r>
-          </a:p>
-        </p:txBody>
-      </p:sp>
-      <p:sp>
-        <p:nvSpPr>
-          <p:cNvPr id="15" name="TextBox 14">
-            <a:extLst>
-              <a:ext uri="{FF2B5EF4-FFF2-40B4-BE49-F238E27FC236}">
-                <a16:creationId xmlns:a16="http://schemas.microsoft.com/office/drawing/2014/main" id="{4D54B423-5A63-4716-841E-D2EFB9881874}"/>
-              </a:ext>
-            </a:extLst>
-          </p:cNvPr>
-          <p:cNvSpPr txBox="1"/>
-          <p:nvPr/>
-        </p:nvSpPr>
-        <p:spPr>
-          <a:xfrm>
-            <a:off x="3794485" y="3795392"/>
-            <a:ext cx="4137753" cy="2839239"/>
-          </a:xfrm>
-          <a:prstGeom prst="rect">
-            <a:avLst/>
-          </a:prstGeom>
-          <a:solidFill>
-            <a:schemeClr val="bg1">
-              <a:lumMod val="95000"/>
-            </a:schemeClr>
-          </a:solidFill>
-          <a:ln>
-            <a:solidFill>
-              <a:schemeClr val="accent1"/>
-            </a:solidFill>
-          </a:ln>
-        </p:spPr>
-        <p:txBody>
-          <a:bodyPr wrap="square" rtlCol="0">
-            <a:spAutoFit/>
-          </a:bodyPr>
-          <a:lstStyle/>
-          <a:p>
-            <a:r>
-              <a:rPr lang="en-US" sz="1050" b="1" dirty="0"/>
-              <a:t>Methods</a:t>
-            </a:r>
-          </a:p>
-          <a:p>
-            <a:r>
-              <a:rPr lang="en-US" sz="1050" dirty="0"/>
-              <a:t>This </a:t>
-            </a:r>
-            <a:r>
-              <a:rPr lang="en-US" sz="1050" dirty="0" err="1"/>
-              <a:t>Baysian</a:t>
-            </a:r>
-            <a:r>
-              <a:rPr lang="en-US" sz="1050" dirty="0"/>
-              <a:t> “total evidence” phylogenetic analysis of extant and fossils species, combining morphological and molecular data as well as stratigraphic ranges from the fossil samples is called the Fossilized Birth-Death Model. Morphological data is the phenotypic or physical data and the molecular data is the genetic data. Stratigraphic ranges are the approximated range of the fossil specimen’s age. The FBD function is ran using </a:t>
-            </a:r>
-            <a:r>
-              <a:rPr lang="en-US" sz="1050" dirty="0" err="1"/>
-              <a:t>RevBayes</a:t>
-            </a:r>
-            <a:r>
-              <a:rPr lang="en-US" sz="1050" dirty="0"/>
-              <a:t>. In our experiment, we’d like to better understand the phylogenetic tree of Formicidae. Our base function to run our analysis of genetic data collected and compose a phylogenetic tree, is the FDB model. This requires that our genetic data on Formicidae be formatted to selective inputs of the FBD model function. With a group selected Formicidae genus that we’ve obtained genetic info for, we sorted through the extant species and extinct species. Next approximations of intervals of the extinct fossils must be derived. Lastly, genetic data as well as fossil intervals are inputted into the FBD model function to create a phylogeny. </a:t>
-            </a:r>
-          </a:p>
-        </p:txBody>
-      </p:sp>
-      <p:sp>
-        <p:nvSpPr>
-          <p:cNvPr id="13" name="TextBox 12">
-            <a:extLst>
-              <a:ext uri="{FF2B5EF4-FFF2-40B4-BE49-F238E27FC236}">
-                <a16:creationId xmlns:a16="http://schemas.microsoft.com/office/drawing/2014/main" id="{05BE9F75-64C9-4B3A-9D07-EEAF8DBD448E}"/>
-              </a:ext>
-            </a:extLst>
-          </p:cNvPr>
-          <p:cNvSpPr txBox="1"/>
-          <p:nvPr/>
-        </p:nvSpPr>
-        <p:spPr>
-          <a:xfrm>
-            <a:off x="292961" y="204713"/>
-            <a:ext cx="7765317" cy="923330"/>
-          </a:xfrm>
-          <a:prstGeom prst="rect">
-            <a:avLst/>
-          </a:prstGeom>
-          <a:solidFill>
-            <a:schemeClr val="bg1"/>
-          </a:solidFill>
-          <a:ln>
-            <a:solidFill>
-              <a:schemeClr val="tx1"/>
-            </a:solidFill>
-          </a:ln>
-        </p:spPr>
-        <p:txBody>
-          <a:bodyPr wrap="square" rtlCol="0">
-            <a:spAutoFit/>
-          </a:bodyPr>
-          <a:lstStyle/>
-          <a:p>
-            <a:pPr algn="r"/>
-            <a:r>
-              <a:rPr lang="en-US" b="1" dirty="0"/>
-              <a:t>Implementing the Dirichlet Process to Improve </a:t>
-            </a:r>
-          </a:p>
-          <a:p>
-            <a:pPr algn="r"/>
-            <a:r>
-              <a:rPr lang="en-US" b="1" dirty="0"/>
-              <a:t>Computational Efficiency of Partition of Big Data Sets </a:t>
-            </a:r>
-          </a:p>
-          <a:p>
-            <a:pPr algn="r"/>
-            <a:r>
-              <a:rPr lang="en-US" dirty="0"/>
-              <a:t>Tyler Tran and April Wright PhD</a:t>
-            </a:r>
-          </a:p>
-        </p:txBody>
-      </p:sp>
-      <p:pic>
-        <p:nvPicPr>
-          <p:cNvPr id="16" name="Picture 15">
-            <a:extLst>
-              <a:ext uri="{FF2B5EF4-FFF2-40B4-BE49-F238E27FC236}">
-                <a16:creationId xmlns:a16="http://schemas.microsoft.com/office/drawing/2014/main" id="{8E5A4FCD-B9BF-4338-9642-8BB3A4949DBF}"/>
-              </a:ext>
-            </a:extLst>
-          </p:cNvPr>
-          <p:cNvPicPr>
-            <a:picLocks noChangeAspect="1"/>
-          </p:cNvPicPr>
-          <p:nvPr/>
-        </p:nvPicPr>
-        <p:blipFill rotWithShape="1">
-          <a:blip r:embed="rId3"/>
-          <a:srcRect l="9691" t="14911" r="6819" b="22294"/>
-          <a:stretch/>
-        </p:blipFill>
-        <p:spPr>
-          <a:xfrm>
-            <a:off x="305759" y="713762"/>
-            <a:ext cx="2020191" cy="407683"/>
-          </a:xfrm>
-          <a:prstGeom prst="rect">
-            <a:avLst/>
-          </a:prstGeom>
-          <a:ln>
-            <a:noFill/>
-          </a:ln>
-        </p:spPr>
-      </p:pic>
-      <p:pic>
-        <p:nvPicPr>
-          <p:cNvPr id="1036" name="Picture 12" descr="Image result for southeastern louisiana university">
-            <a:extLst>
-              <a:ext uri="{FF2B5EF4-FFF2-40B4-BE49-F238E27FC236}">
-                <a16:creationId xmlns:a16="http://schemas.microsoft.com/office/drawing/2014/main" id="{7D9F344E-1869-4113-8399-F188BDAEE542}"/>
-              </a:ext>
-            </a:extLst>
-          </p:cNvPr>
-          <p:cNvPicPr>
-            <a:picLocks noChangeAspect="1" noChangeArrowheads="1"/>
-          </p:cNvPicPr>
-          <p:nvPr/>
-        </p:nvPicPr>
-        <p:blipFill>
-          <a:blip r:embed="rId4">
-            <a:extLst>
-              <a:ext uri="{28A0092B-C50C-407E-A947-70E740481C1C}">
-                <a14:useLocalDpi xmlns:a14="http://schemas.microsoft.com/office/drawing/2010/main" val="0"/>
-              </a:ext>
-            </a:extLst>
-          </a:blip>
-          <a:srcRect/>
-          <a:stretch>
-            <a:fillRect/>
-          </a:stretch>
-        </p:blipFill>
-        <p:spPr bwMode="auto">
-          <a:xfrm>
-            <a:off x="305759" y="215754"/>
-            <a:ext cx="2020191" cy="498126"/>
-          </a:xfrm>
-          <a:prstGeom prst="rect">
-            <a:avLst/>
-          </a:prstGeom>
-          <a:noFill/>
-          <a:ln>
-            <a:noFill/>
-          </a:ln>
-          <a:extLst>
-            <a:ext uri="{909E8E84-426E-40DD-AFC4-6F175D3DCCD1}">
-              <a14:hiddenFill xmlns:a14="http://schemas.microsoft.com/office/drawing/2010/main">
-                <a:solidFill>
-                  <a:srgbClr val="FFFFFF"/>
-                </a:solidFill>
-              </a14:hiddenFill>
-            </a:ext>
-          </a:extLst>
-        </p:spPr>
-      </p:pic>
-      <p:pic>
-        <p:nvPicPr>
-          <p:cNvPr id="5124" name="Picture 4" descr="LSU Computational Biology Seminar Series Spring 2019">
-            <a:extLst>
-              <a:ext uri="{FF2B5EF4-FFF2-40B4-BE49-F238E27FC236}">
-                <a16:creationId xmlns:a16="http://schemas.microsoft.com/office/drawing/2014/main" id="{261D3B27-F3C2-427E-946A-B547F47ABB3B}"/>
-              </a:ext>
-            </a:extLst>
-          </p:cNvPr>
-          <p:cNvPicPr>
-            <a:picLocks noChangeAspect="1" noChangeArrowheads="1"/>
-          </p:cNvPicPr>
-          <p:nvPr/>
-        </p:nvPicPr>
-        <p:blipFill>
-          <a:blip r:embed="rId5">
-            <a:extLst>
-              <a:ext uri="{28A0092B-C50C-407E-A947-70E740481C1C}">
-                <a14:useLocalDpi xmlns:a14="http://schemas.microsoft.com/office/drawing/2010/main" val="0"/>
-              </a:ext>
-            </a:extLst>
-          </a:blip>
-          <a:srcRect/>
-          <a:stretch>
-            <a:fillRect/>
-          </a:stretch>
-        </p:blipFill>
-        <p:spPr bwMode="auto">
-          <a:xfrm>
-            <a:off x="8353887" y="5792649"/>
-            <a:ext cx="909418" cy="841981"/>
-          </a:xfrm>
-          <a:prstGeom prst="rect">
-            <a:avLst/>
-          </a:prstGeom>
-          <a:noFill/>
-          <a:extLst>
-            <a:ext uri="{909E8E84-426E-40DD-AFC4-6F175D3DCCD1}">
-              <a14:hiddenFill xmlns:a14="http://schemas.microsoft.com/office/drawing/2010/main">
-                <a:solidFill>
-                  <a:srgbClr val="FFFFFF"/>
-                </a:solidFill>
-              </a14:hiddenFill>
-            </a:ext>
-          </a:extLst>
-        </p:spPr>
-      </p:pic>
-      <p:pic>
-        <p:nvPicPr>
-          <p:cNvPr id="14" name="Picture 20" descr="Image result for southeastern louisiana university biology">
-            <a:extLst>
-              <a:ext uri="{FF2B5EF4-FFF2-40B4-BE49-F238E27FC236}">
-                <a16:creationId xmlns:a16="http://schemas.microsoft.com/office/drawing/2014/main" id="{3147B12F-41AC-45B5-B926-48A8ABA1B423}"/>
-              </a:ext>
-            </a:extLst>
-          </p:cNvPr>
-          <p:cNvPicPr>
-            <a:picLocks noChangeAspect="1" noChangeArrowheads="1"/>
-          </p:cNvPicPr>
-          <p:nvPr/>
-        </p:nvPicPr>
-        <p:blipFill rotWithShape="1">
-          <a:blip r:embed="rId6">
-            <a:extLst>
-              <a:ext uri="{28A0092B-C50C-407E-A947-70E740481C1C}">
-                <a14:useLocalDpi xmlns:a14="http://schemas.microsoft.com/office/drawing/2010/main" val="0"/>
-              </a:ext>
-            </a:extLst>
-          </a:blip>
-          <a:srcRect l="9312" r="10187"/>
-          <a:stretch/>
-        </p:blipFill>
-        <p:spPr bwMode="auto">
-          <a:xfrm>
-            <a:off x="9684954" y="5855663"/>
-            <a:ext cx="2215662" cy="683517"/>
-          </a:xfrm>
-          <a:prstGeom prst="rect">
-            <a:avLst/>
-          </a:prstGeom>
-          <a:noFill/>
-          <a:extLst>
-            <a:ext uri="{909E8E84-426E-40DD-AFC4-6F175D3DCCD1}">
-              <a14:hiddenFill xmlns:a14="http://schemas.microsoft.com/office/drawing/2010/main">
-                <a:solidFill>
-                  <a:srgbClr val="FFFFFF"/>
-                </a:solidFill>
-              </a14:hiddenFill>
-            </a:ext>
-          </a:extLst>
-        </p:spPr>
-      </p:pic>
-    </p:spTree>
-    <p:extLst>
-      <p:ext uri="{BB962C8B-B14F-4D97-AF65-F5344CB8AC3E}">
-        <p14:creationId xmlns:p14="http://schemas.microsoft.com/office/powerpoint/2010/main" val="213537390"/>
-      </p:ext>
-    </p:extLst>
-  </p:cSld>
-  <p:clrMapOvr>
-    <a:masterClrMapping/>
   </p:clrMapOvr>
 </p:sld>
 </file>

</xml_diff>

<commit_message>
Few small changes to the final powerpoint before printing.
</commit_message>
<xml_diff>
--- a/Draft_Poster.pptx
+++ b/Draft_Poster.pptx
@@ -259,7 +259,7 @@
           <a:p>
             <a:fld id="{17B15591-64E1-4620-A2EF-1876399A9EDC}" type="datetimeFigureOut">
               <a:rPr lang="en-US" smtClean="0"/>
-              <a:t>3/19/2019</a:t>
+              <a:t>3/31/2019</a:t>
             </a:fld>
             <a:endParaRPr lang="en-US"/>
           </a:p>
@@ -457,7 +457,7 @@
           <a:p>
             <a:fld id="{17B15591-64E1-4620-A2EF-1876399A9EDC}" type="datetimeFigureOut">
               <a:rPr lang="en-US" smtClean="0"/>
-              <a:t>3/19/2019</a:t>
+              <a:t>3/31/2019</a:t>
             </a:fld>
             <a:endParaRPr lang="en-US"/>
           </a:p>
@@ -665,7 +665,7 @@
           <a:p>
             <a:fld id="{17B15591-64E1-4620-A2EF-1876399A9EDC}" type="datetimeFigureOut">
               <a:rPr lang="en-US" smtClean="0"/>
-              <a:t>3/19/2019</a:t>
+              <a:t>3/31/2019</a:t>
             </a:fld>
             <a:endParaRPr lang="en-US"/>
           </a:p>
@@ -863,7 +863,7 @@
           <a:p>
             <a:fld id="{17B15591-64E1-4620-A2EF-1876399A9EDC}" type="datetimeFigureOut">
               <a:rPr lang="en-US" smtClean="0"/>
-              <a:t>3/19/2019</a:t>
+              <a:t>3/31/2019</a:t>
             </a:fld>
             <a:endParaRPr lang="en-US"/>
           </a:p>
@@ -1138,7 +1138,7 @@
           <a:p>
             <a:fld id="{17B15591-64E1-4620-A2EF-1876399A9EDC}" type="datetimeFigureOut">
               <a:rPr lang="en-US" smtClean="0"/>
-              <a:t>3/19/2019</a:t>
+              <a:t>3/31/2019</a:t>
             </a:fld>
             <a:endParaRPr lang="en-US"/>
           </a:p>
@@ -1403,7 +1403,7 @@
           <a:p>
             <a:fld id="{17B15591-64E1-4620-A2EF-1876399A9EDC}" type="datetimeFigureOut">
               <a:rPr lang="en-US" smtClean="0"/>
-              <a:t>3/19/2019</a:t>
+              <a:t>3/31/2019</a:t>
             </a:fld>
             <a:endParaRPr lang="en-US"/>
           </a:p>
@@ -1815,7 +1815,7 @@
           <a:p>
             <a:fld id="{17B15591-64E1-4620-A2EF-1876399A9EDC}" type="datetimeFigureOut">
               <a:rPr lang="en-US" smtClean="0"/>
-              <a:t>3/19/2019</a:t>
+              <a:t>3/31/2019</a:t>
             </a:fld>
             <a:endParaRPr lang="en-US"/>
           </a:p>
@@ -1956,7 +1956,7 @@
           <a:p>
             <a:fld id="{17B15591-64E1-4620-A2EF-1876399A9EDC}" type="datetimeFigureOut">
               <a:rPr lang="en-US" smtClean="0"/>
-              <a:t>3/19/2019</a:t>
+              <a:t>3/31/2019</a:t>
             </a:fld>
             <a:endParaRPr lang="en-US"/>
           </a:p>
@@ -2069,7 +2069,7 @@
           <a:p>
             <a:fld id="{17B15591-64E1-4620-A2EF-1876399A9EDC}" type="datetimeFigureOut">
               <a:rPr lang="en-US" smtClean="0"/>
-              <a:t>3/19/2019</a:t>
+              <a:t>3/31/2019</a:t>
             </a:fld>
             <a:endParaRPr lang="en-US"/>
           </a:p>
@@ -2380,7 +2380,7 @@
           <a:p>
             <a:fld id="{17B15591-64E1-4620-A2EF-1876399A9EDC}" type="datetimeFigureOut">
               <a:rPr lang="en-US" smtClean="0"/>
-              <a:t>3/19/2019</a:t>
+              <a:t>3/31/2019</a:t>
             </a:fld>
             <a:endParaRPr lang="en-US"/>
           </a:p>
@@ -2668,7 +2668,7 @@
           <a:p>
             <a:fld id="{17B15591-64E1-4620-A2EF-1876399A9EDC}" type="datetimeFigureOut">
               <a:rPr lang="en-US" smtClean="0"/>
-              <a:t>3/19/2019</a:t>
+              <a:t>3/31/2019</a:t>
             </a:fld>
             <a:endParaRPr lang="en-US"/>
           </a:p>
@@ -2909,7 +2909,7 @@
           <a:p>
             <a:fld id="{17B15591-64E1-4620-A2EF-1876399A9EDC}" type="datetimeFigureOut">
               <a:rPr lang="en-US" smtClean="0"/>
-              <a:t>3/19/2019</a:t>
+              <a:t>3/31/2019</a:t>
             </a:fld>
             <a:endParaRPr lang="en-US"/>
           </a:p>
@@ -3345,7 +3345,7 @@
         </p:nvSpPr>
         <p:spPr>
           <a:xfrm>
-            <a:off x="305759" y="132753"/>
+            <a:off x="305759" y="344889"/>
             <a:ext cx="11639434" cy="1200329"/>
           </a:xfrm>
           <a:prstGeom prst="rect">
@@ -3356,7 +3356,7 @@
           </a:solidFill>
           <a:ln>
             <a:solidFill>
-              <a:schemeClr val="tx1"/>
+              <a:srgbClr val="0070C0"/>
             </a:solidFill>
           </a:ln>
         </p:spPr>
@@ -3369,7 +3369,7 @@
             <a:pPr algn="ctr"/>
             <a:r>
               <a:rPr lang="en-US" b="1" dirty="0"/>
-              <a:t>Implementing the Fossilized Birth-Death Model</a:t>
+              <a:t>Unifying Phenotypic and Molecular Data for Phylogenetic Estimation</a:t>
             </a:r>
           </a:p>
           <a:p>
@@ -3409,8 +3409,8 @@
         </p:nvSpPr>
         <p:spPr>
           <a:xfrm>
-            <a:off x="305759" y="3942690"/>
-            <a:ext cx="3217639" cy="2708434"/>
+            <a:off x="392496" y="4151077"/>
+            <a:ext cx="3055892" cy="2308324"/>
           </a:xfrm>
           <a:prstGeom prst="rect">
             <a:avLst/>
@@ -3440,7 +3440,7 @@
           <a:p>
             <a:r>
               <a:rPr lang="en-US" sz="1300" dirty="0"/>
-              <a:t>Scattered countlessly across the surface of the earth are nearly 15,000 described ant species. These ants are major parts of every ecosystem they inhabit as they aid tremendously in the decomposition as well interacting directly with most of the flora. Scientifically known as Formicidae, ants’ biomass approximately equals that of humanity. Their current diversity in conjunction to their enormous fossil records provides astounding amounts of genetic data for phylogenetic testing and analysis. </a:t>
+              <a:t>On earth are nearly 12,000 currently described ant species. These ants are major parts of every ecosystem they inhabit as they aid tremendously in the decomposition. Interactions with other species on the food webs is very dynamic. Their incredible current diversity in conjunction to their available data records provides astounding amounts of data for phylogenetic testing and analysis. </a:t>
             </a:r>
           </a:p>
         </p:txBody>
@@ -3459,8 +3459,8 @@
         </p:nvSpPr>
         <p:spPr>
           <a:xfrm>
-            <a:off x="8549196" y="4942964"/>
-            <a:ext cx="3395997" cy="1708160"/>
+            <a:off x="8889299" y="4751400"/>
+            <a:ext cx="3055892" cy="1708160"/>
           </a:xfrm>
           <a:prstGeom prst="rect">
             <a:avLst/>
@@ -3509,8 +3509,8 @@
         </p:nvSpPr>
         <p:spPr>
           <a:xfrm>
-            <a:off x="4019303" y="5604684"/>
-            <a:ext cx="4033988" cy="1046440"/>
+            <a:off x="5166804" y="5455820"/>
+            <a:ext cx="3347500" cy="1046440"/>
           </a:xfrm>
           <a:prstGeom prst="rect">
             <a:avLst/>
@@ -3541,7 +3541,7 @@
             <a:endParaRPr lang="en-US" sz="1400" b="1" dirty="0"/>
           </a:p>
           <a:p>
-            <a:pPr algn="ctr"/>
+            <a:pPr algn="r"/>
             <a:r>
               <a:rPr lang="en-US" b="1" dirty="0"/>
               <a:t>Acknowledgements</a:t>
@@ -3549,53 +3549,6 @@
           </a:p>
         </p:txBody>
       </p:sp>
-      <p:pic>
-        <p:nvPicPr>
-          <p:cNvPr id="1028" name="Picture 4" descr="Image result for phylogenetic ant tree">
-            <a:extLst>
-              <a:ext uri="{FF2B5EF4-FFF2-40B4-BE49-F238E27FC236}">
-                <a16:creationId xmlns:a16="http://schemas.microsoft.com/office/drawing/2014/main" id="{6DCD5189-60E5-4CE0-81DA-1A9527D972F3}"/>
-              </a:ext>
-            </a:extLst>
-          </p:cNvPr>
-          <p:cNvPicPr>
-            <a:picLocks noChangeAspect="1" noChangeArrowheads="1"/>
-          </p:cNvPicPr>
-          <p:nvPr/>
-        </p:nvPicPr>
-        <p:blipFill>
-          <a:blip r:embed="rId3">
-            <a:extLst>
-              <a:ext uri="{28A0092B-C50C-407E-A947-70E740481C1C}">
-                <a14:useLocalDpi xmlns:a14="http://schemas.microsoft.com/office/drawing/2010/main" val="0"/>
-              </a:ext>
-            </a:extLst>
-          </a:blip>
-          <a:srcRect/>
-          <a:stretch>
-            <a:fillRect/>
-          </a:stretch>
-        </p:blipFill>
-        <p:spPr bwMode="auto">
-          <a:xfrm>
-            <a:off x="4019303" y="1553074"/>
-            <a:ext cx="4033988" cy="3751851"/>
-          </a:xfrm>
-          <a:prstGeom prst="rect">
-            <a:avLst/>
-          </a:prstGeom>
-          <a:noFill/>
-          <a:extLst>
-            <a:ext uri="{909E8E84-426E-40DD-AFC4-6F175D3DCCD1}">
-              <a14:hiddenFill xmlns:a14="http://schemas.microsoft.com/office/drawing/2010/main">
-                <a:solidFill>
-                  <a:srgbClr val="FFFFFF"/>
-                </a:solidFill>
-              </a14:hiddenFill>
-            </a:ext>
-          </a:extLst>
-        </p:spPr>
-      </p:pic>
       <p:sp>
         <p:nvSpPr>
           <p:cNvPr id="12" name="TextBox 11">
@@ -3610,8 +3563,8 @@
         </p:nvSpPr>
         <p:spPr>
           <a:xfrm>
-            <a:off x="305759" y="1476555"/>
-            <a:ext cx="3217639" cy="2308324"/>
+            <a:off x="392496" y="1794013"/>
+            <a:ext cx="3055892" cy="2108269"/>
           </a:xfrm>
           <a:prstGeom prst="rect">
             <a:avLst/>
@@ -3649,7 +3602,7 @@
             </a:r>
             <a:r>
               <a:rPr lang="en-US" sz="1300" dirty="0"/>
-              <a:t>. Results of our function are configured into the phylogeny. </a:t>
+              <a:t>. </a:t>
             </a:r>
           </a:p>
         </p:txBody>
@@ -3668,8 +3621,8 @@
         </p:nvSpPr>
         <p:spPr>
           <a:xfrm>
-            <a:off x="8549196" y="1476555"/>
-            <a:ext cx="3395997" cy="3308598"/>
+            <a:off x="8889298" y="1794013"/>
+            <a:ext cx="3055893" cy="2708434"/>
           </a:xfrm>
           <a:prstGeom prst="rect">
             <a:avLst/>
@@ -3707,7 +3660,7 @@
             </a:r>
             <a:r>
               <a:rPr lang="en-US" sz="1300" dirty="0"/>
-              <a:t> “total evidence” phylogenetic analysis of extant and fossils species, combining morphological and molecular data as well as stratigraphic ranges from the fossil samples is called the Fossilized Birth-Death Model. Morphological data is the phenotypic or physical data and the molecular data is the genetic data. Stratigraphic ranges are the approximated range of the fossil specimen’s age. The FBD function is ran using </a:t>
+              <a:t> “total evidence” phylogenetic analysis of extant and fossils species, combining morphological and molecular data as well as stratigraphic ranges from the fossil samples is called the Fossilized Birth-Death Model. The FBD function is ran using </a:t>
             </a:r>
             <a:r>
               <a:rPr lang="en-US" sz="1300" dirty="0" err="1"/>
@@ -3740,13 +3693,13 @@
           <p:nvPr/>
         </p:nvPicPr>
         <p:blipFill rotWithShape="1">
-          <a:blip r:embed="rId4"/>
+          <a:blip r:embed="rId3"/>
           <a:srcRect l="9691" t="14911" r="6819" b="22294"/>
           <a:stretch/>
         </p:blipFill>
         <p:spPr>
           <a:xfrm>
-            <a:off x="9126468" y="388937"/>
+            <a:off x="9644789" y="884152"/>
             <a:ext cx="2241452" cy="559205"/>
           </a:xfrm>
           <a:prstGeom prst="rect">
@@ -3774,7 +3727,7 @@
           <p:nvPr/>
         </p:nvPicPr>
         <p:blipFill>
-          <a:blip r:embed="rId5">
+          <a:blip r:embed="rId4">
             <a:extLst>
               <a:ext uri="{28A0092B-C50C-407E-A947-70E740481C1C}">
                 <a14:useLocalDpi xmlns:a14="http://schemas.microsoft.com/office/drawing/2010/main" val="0"/>
@@ -3788,7 +3741,7 @@
         </p:blipFill>
         <p:spPr bwMode="auto">
           <a:xfrm>
-            <a:off x="473372" y="313175"/>
+            <a:off x="392496" y="808392"/>
             <a:ext cx="2882412" cy="710727"/>
           </a:xfrm>
           <a:prstGeom prst="rect">
@@ -3826,7 +3779,7 @@
           <p:nvPr/>
         </p:nvPicPr>
         <p:blipFill rotWithShape="1">
-          <a:blip r:embed="rId6">
+          <a:blip r:embed="rId5">
             <a:extLst>
               <a:ext uri="{28A0092B-C50C-407E-A947-70E740481C1C}">
                 <a14:useLocalDpi xmlns:a14="http://schemas.microsoft.com/office/drawing/2010/main" val="0"/>
@@ -3838,7 +3791,7 @@
         </p:blipFill>
         <p:spPr bwMode="auto">
           <a:xfrm>
-            <a:off x="5953958" y="5684987"/>
+            <a:off x="6580393" y="5501250"/>
             <a:ext cx="1836432" cy="566527"/>
           </a:xfrm>
           <a:prstGeom prst="rect">
@@ -3871,7 +3824,7 @@
           <p:nvPr/>
         </p:nvPicPr>
         <p:blipFill>
-          <a:blip r:embed="rId7">
+          <a:blip r:embed="rId6">
             <a:extLst>
               <a:ext uri="{28A0092B-C50C-407E-A947-70E740481C1C}">
                 <a14:useLocalDpi xmlns:a14="http://schemas.microsoft.com/office/drawing/2010/main" val="0"/>
@@ -3885,7 +3838,7 @@
         </p:blipFill>
         <p:spPr bwMode="auto">
           <a:xfrm>
-            <a:off x="4369787" y="5669687"/>
+            <a:off x="5249227" y="5501249"/>
             <a:ext cx="1233687" cy="566527"/>
           </a:xfrm>
           <a:prstGeom prst="rect">
@@ -3901,6 +3854,41 @@
               </a14:hiddenFill>
             </a:ext>
           </a:extLst>
+        </p:spPr>
+      </p:pic>
+      <p:pic>
+        <p:nvPicPr>
+          <p:cNvPr id="2" name="Picture 1">
+            <a:extLst>
+              <a:ext uri="{FF2B5EF4-FFF2-40B4-BE49-F238E27FC236}">
+                <a16:creationId xmlns:a16="http://schemas.microsoft.com/office/drawing/2014/main" id="{231117A5-62C6-44AC-A1C0-C2EDAF4D151F}"/>
+              </a:ext>
+            </a:extLst>
+          </p:cNvPr>
+          <p:cNvPicPr>
+            <a:picLocks noChangeAspect="1"/>
+          </p:cNvPicPr>
+          <p:nvPr/>
+        </p:nvPicPr>
+        <p:blipFill>
+          <a:blip r:embed="rId7"/>
+          <a:stretch>
+            <a:fillRect/>
+          </a:stretch>
+        </p:blipFill>
+        <p:spPr>
+          <a:xfrm>
+            <a:off x="3823383" y="1794012"/>
+            <a:ext cx="4690921" cy="3518191"/>
+          </a:xfrm>
+          <a:prstGeom prst="rect">
+            <a:avLst/>
+          </a:prstGeom>
+          <a:ln>
+            <a:solidFill>
+              <a:srgbClr val="0070C0"/>
+            </a:solidFill>
+          </a:ln>
         </p:spPr>
       </p:pic>
     </p:spTree>

</xml_diff>